<commit_message>
Working on last query.
</commit_message>
<xml_diff>
--- a/src/assets/Assets.pptx
+++ b/src/assets/Assets.pptx
@@ -8,6 +8,8 @@
     <p:sldId id="256" r:id="rId2"/>
     <p:sldId id="257" r:id="rId3"/>
     <p:sldId id="258" r:id="rId4"/>
+    <p:sldId id="259" r:id="rId5"/>
+    <p:sldId id="260" r:id="rId6"/>
   </p:sldIdLst>
   <p:sldSz cx="12192000" cy="6858000"/>
   <p:notesSz cx="6858000" cy="9144000"/>
@@ -261,7 +263,7 @@
           <a:p>
             <a:fld id="{AD428951-569D-4BEE-9DDF-471D87F3952B}" type="datetimeFigureOut">
               <a:rPr lang="it-IT" smtClean="0"/>
-              <a:t>10/10/2018</a:t>
+              <a:t>07/11/2018</a:t>
             </a:fld>
             <a:endParaRPr lang="it-IT"/>
           </a:p>
@@ -459,7 +461,7 @@
           <a:p>
             <a:fld id="{AD428951-569D-4BEE-9DDF-471D87F3952B}" type="datetimeFigureOut">
               <a:rPr lang="it-IT" smtClean="0"/>
-              <a:t>10/10/2018</a:t>
+              <a:t>07/11/2018</a:t>
             </a:fld>
             <a:endParaRPr lang="it-IT"/>
           </a:p>
@@ -667,7 +669,7 @@
           <a:p>
             <a:fld id="{AD428951-569D-4BEE-9DDF-471D87F3952B}" type="datetimeFigureOut">
               <a:rPr lang="it-IT" smtClean="0"/>
-              <a:t>10/10/2018</a:t>
+              <a:t>07/11/2018</a:t>
             </a:fld>
             <a:endParaRPr lang="it-IT"/>
           </a:p>
@@ -865,7 +867,7 @@
           <a:p>
             <a:fld id="{AD428951-569D-4BEE-9DDF-471D87F3952B}" type="datetimeFigureOut">
               <a:rPr lang="it-IT" smtClean="0"/>
-              <a:t>10/10/2018</a:t>
+              <a:t>07/11/2018</a:t>
             </a:fld>
             <a:endParaRPr lang="it-IT"/>
           </a:p>
@@ -1140,7 +1142,7 @@
           <a:p>
             <a:fld id="{AD428951-569D-4BEE-9DDF-471D87F3952B}" type="datetimeFigureOut">
               <a:rPr lang="it-IT" smtClean="0"/>
-              <a:t>10/10/2018</a:t>
+              <a:t>07/11/2018</a:t>
             </a:fld>
             <a:endParaRPr lang="it-IT"/>
           </a:p>
@@ -1405,7 +1407,7 @@
           <a:p>
             <a:fld id="{AD428951-569D-4BEE-9DDF-471D87F3952B}" type="datetimeFigureOut">
               <a:rPr lang="it-IT" smtClean="0"/>
-              <a:t>10/10/2018</a:t>
+              <a:t>07/11/2018</a:t>
             </a:fld>
             <a:endParaRPr lang="it-IT"/>
           </a:p>
@@ -1817,7 +1819,7 @@
           <a:p>
             <a:fld id="{AD428951-569D-4BEE-9DDF-471D87F3952B}" type="datetimeFigureOut">
               <a:rPr lang="it-IT" smtClean="0"/>
-              <a:t>10/10/2018</a:t>
+              <a:t>07/11/2018</a:t>
             </a:fld>
             <a:endParaRPr lang="it-IT"/>
           </a:p>
@@ -1958,7 +1960,7 @@
           <a:p>
             <a:fld id="{AD428951-569D-4BEE-9DDF-471D87F3952B}" type="datetimeFigureOut">
               <a:rPr lang="it-IT" smtClean="0"/>
-              <a:t>10/10/2018</a:t>
+              <a:t>07/11/2018</a:t>
             </a:fld>
             <a:endParaRPr lang="it-IT"/>
           </a:p>
@@ -2071,7 +2073,7 @@
           <a:p>
             <a:fld id="{AD428951-569D-4BEE-9DDF-471D87F3952B}" type="datetimeFigureOut">
               <a:rPr lang="it-IT" smtClean="0"/>
-              <a:t>10/10/2018</a:t>
+              <a:t>07/11/2018</a:t>
             </a:fld>
             <a:endParaRPr lang="it-IT"/>
           </a:p>
@@ -2382,7 +2384,7 @@
           <a:p>
             <a:fld id="{AD428951-569D-4BEE-9DDF-471D87F3952B}" type="datetimeFigureOut">
               <a:rPr lang="it-IT" smtClean="0"/>
-              <a:t>10/10/2018</a:t>
+              <a:t>07/11/2018</a:t>
             </a:fld>
             <a:endParaRPr lang="it-IT"/>
           </a:p>
@@ -2670,7 +2672,7 @@
           <a:p>
             <a:fld id="{AD428951-569D-4BEE-9DDF-471D87F3952B}" type="datetimeFigureOut">
               <a:rPr lang="it-IT" smtClean="0"/>
-              <a:t>10/10/2018</a:t>
+              <a:t>07/11/2018</a:t>
             </a:fld>
             <a:endParaRPr lang="it-IT"/>
           </a:p>
@@ -2911,7 +2913,7 @@
           <a:p>
             <a:fld id="{AD428951-569D-4BEE-9DDF-471D87F3952B}" type="datetimeFigureOut">
               <a:rPr lang="it-IT" smtClean="0"/>
-              <a:t>10/10/2018</a:t>
+              <a:t>07/11/2018</a:t>
             </a:fld>
             <a:endParaRPr lang="it-IT"/>
           </a:p>
@@ -4787,6 +4789,2260 @@
 </p:sld>
 </file>
 
+<file path=ppt/slides/slide4.xml><?xml version="1.0" encoding="utf-8"?>
+<p:sld xmlns:a="http://schemas.openxmlformats.org/drawingml/2006/main" xmlns:r="http://schemas.openxmlformats.org/officeDocument/2006/relationships" xmlns:p="http://schemas.openxmlformats.org/presentationml/2006/main">
+  <p:cSld>
+    <p:spTree>
+      <p:nvGrpSpPr>
+        <p:cNvPr id="1" name=""/>
+        <p:cNvGrpSpPr/>
+        <p:nvPr/>
+      </p:nvGrpSpPr>
+      <p:grpSpPr>
+        <a:xfrm>
+          <a:off x="0" y="0"/>
+          <a:ext cx="0" cy="0"/>
+          <a:chOff x="0" y="0"/>
+          <a:chExt cx="0" cy="0"/>
+        </a:xfrm>
+      </p:grpSpPr>
+      <p:grpSp>
+        <p:nvGrpSpPr>
+          <p:cNvPr id="4" name="Gruppo 3">
+            <a:extLst>
+              <a:ext uri="{FF2B5EF4-FFF2-40B4-BE49-F238E27FC236}">
+                <a16:creationId xmlns:a16="http://schemas.microsoft.com/office/drawing/2014/main" id="{8B3338D5-7D89-494C-8291-973DB295F977}"/>
+              </a:ext>
+            </a:extLst>
+          </p:cNvPr>
+          <p:cNvGrpSpPr/>
+          <p:nvPr/>
+        </p:nvGrpSpPr>
+        <p:grpSpPr>
+          <a:xfrm flipH="1">
+            <a:off x="2080823" y="2395214"/>
+            <a:ext cx="1826454" cy="932777"/>
+            <a:chOff x="2080823" y="2395214"/>
+            <a:chExt cx="2083981" cy="1064297"/>
+          </a:xfrm>
+        </p:grpSpPr>
+        <p:cxnSp>
+          <p:nvCxnSpPr>
+            <p:cNvPr id="5" name="Connettore a gomito 4">
+              <a:extLst>
+                <a:ext uri="{FF2B5EF4-FFF2-40B4-BE49-F238E27FC236}">
+                  <a16:creationId xmlns:a16="http://schemas.microsoft.com/office/drawing/2014/main" id="{20FECF45-9275-449A-B486-B1B63CDE7F38}"/>
+                </a:ext>
+              </a:extLst>
+            </p:cNvPr>
+            <p:cNvCxnSpPr>
+              <a:cxnSpLocks/>
+            </p:cNvCxnSpPr>
+            <p:nvPr/>
+          </p:nvCxnSpPr>
+          <p:spPr>
+            <a:xfrm rot="16200000" flipH="1">
+              <a:off x="2618857" y="2898163"/>
+              <a:ext cx="412492" cy="297711"/>
+            </a:xfrm>
+            <a:prstGeom prst="bentConnector3">
+              <a:avLst/>
+            </a:prstGeom>
+            <a:ln/>
+          </p:spPr>
+          <p:style>
+            <a:lnRef idx="1">
+              <a:schemeClr val="dk1"/>
+            </a:lnRef>
+            <a:fillRef idx="0">
+              <a:schemeClr val="dk1"/>
+            </a:fillRef>
+            <a:effectRef idx="0">
+              <a:schemeClr val="dk1"/>
+            </a:effectRef>
+            <a:fontRef idx="minor">
+              <a:schemeClr val="tx1"/>
+            </a:fontRef>
+          </p:style>
+        </p:cxnSp>
+        <p:cxnSp>
+          <p:nvCxnSpPr>
+            <p:cNvPr id="8" name="Connettore a gomito 7">
+              <a:extLst>
+                <a:ext uri="{FF2B5EF4-FFF2-40B4-BE49-F238E27FC236}">
+                  <a16:creationId xmlns:a16="http://schemas.microsoft.com/office/drawing/2014/main" id="{4B278F0D-6231-4344-BA26-BDC44FD5D6E0}"/>
+                </a:ext>
+              </a:extLst>
+            </p:cNvPr>
+            <p:cNvCxnSpPr>
+              <a:cxnSpLocks/>
+            </p:cNvCxnSpPr>
+            <p:nvPr/>
+          </p:nvCxnSpPr>
+          <p:spPr>
+            <a:xfrm rot="16200000" flipH="1">
+              <a:off x="2916568" y="3104409"/>
+              <a:ext cx="412492" cy="297711"/>
+            </a:xfrm>
+            <a:prstGeom prst="bentConnector3">
+              <a:avLst/>
+            </a:prstGeom>
+            <a:ln/>
+          </p:spPr>
+          <p:style>
+            <a:lnRef idx="1">
+              <a:schemeClr val="dk1"/>
+            </a:lnRef>
+            <a:fillRef idx="0">
+              <a:schemeClr val="dk1"/>
+            </a:fillRef>
+            <a:effectRef idx="0">
+              <a:schemeClr val="dk1"/>
+            </a:effectRef>
+            <a:fontRef idx="minor">
+              <a:schemeClr val="tx1"/>
+            </a:fontRef>
+          </p:style>
+        </p:cxnSp>
+        <p:cxnSp>
+          <p:nvCxnSpPr>
+            <p:cNvPr id="9" name="Connettore a gomito 8">
+              <a:extLst>
+                <a:ext uri="{FF2B5EF4-FFF2-40B4-BE49-F238E27FC236}">
+                  <a16:creationId xmlns:a16="http://schemas.microsoft.com/office/drawing/2014/main" id="{0540759E-5E02-4E63-A918-494114C8F250}"/>
+                </a:ext>
+              </a:extLst>
+            </p:cNvPr>
+            <p:cNvCxnSpPr>
+              <a:cxnSpLocks/>
+            </p:cNvCxnSpPr>
+            <p:nvPr/>
+          </p:nvCxnSpPr>
+          <p:spPr>
+            <a:xfrm rot="16200000">
+              <a:off x="3214280" y="3104409"/>
+              <a:ext cx="412492" cy="297711"/>
+            </a:xfrm>
+            <a:prstGeom prst="bentConnector3">
+              <a:avLst/>
+            </a:prstGeom>
+            <a:ln/>
+          </p:spPr>
+          <p:style>
+            <a:lnRef idx="1">
+              <a:schemeClr val="dk1"/>
+            </a:lnRef>
+            <a:fillRef idx="0">
+              <a:schemeClr val="dk1"/>
+            </a:fillRef>
+            <a:effectRef idx="0">
+              <a:schemeClr val="dk1"/>
+            </a:effectRef>
+            <a:fontRef idx="minor">
+              <a:schemeClr val="tx1"/>
+            </a:fontRef>
+          </p:style>
+        </p:cxnSp>
+        <p:cxnSp>
+          <p:nvCxnSpPr>
+            <p:cNvPr id="10" name="Connettore a gomito 9">
+              <a:extLst>
+                <a:ext uri="{FF2B5EF4-FFF2-40B4-BE49-F238E27FC236}">
+                  <a16:creationId xmlns:a16="http://schemas.microsoft.com/office/drawing/2014/main" id="{D9C2FDAE-5C39-426E-85C2-B50B8E362272}"/>
+                </a:ext>
+              </a:extLst>
+            </p:cNvPr>
+            <p:cNvCxnSpPr>
+              <a:cxnSpLocks/>
+            </p:cNvCxnSpPr>
+            <p:nvPr/>
+          </p:nvCxnSpPr>
+          <p:spPr>
+            <a:xfrm rot="16200000">
+              <a:off x="2916568" y="2898163"/>
+              <a:ext cx="412492" cy="297711"/>
+            </a:xfrm>
+            <a:prstGeom prst="bentConnector3">
+              <a:avLst/>
+            </a:prstGeom>
+            <a:ln/>
+          </p:spPr>
+          <p:style>
+            <a:lnRef idx="1">
+              <a:schemeClr val="dk1"/>
+            </a:lnRef>
+            <a:fillRef idx="0">
+              <a:schemeClr val="dk1"/>
+            </a:fillRef>
+            <a:effectRef idx="0">
+              <a:schemeClr val="dk1"/>
+            </a:effectRef>
+            <a:fontRef idx="minor">
+              <a:schemeClr val="tx1"/>
+            </a:fontRef>
+          </p:style>
+        </p:cxnSp>
+        <p:grpSp>
+          <p:nvGrpSpPr>
+            <p:cNvPr id="2" name="Gruppo 1">
+              <a:extLst>
+                <a:ext uri="{FF2B5EF4-FFF2-40B4-BE49-F238E27FC236}">
+                  <a16:creationId xmlns:a16="http://schemas.microsoft.com/office/drawing/2014/main" id="{0F68B524-00ED-474B-942C-336352A5545A}"/>
+                </a:ext>
+              </a:extLst>
+            </p:cNvPr>
+            <p:cNvGrpSpPr/>
+            <p:nvPr/>
+          </p:nvGrpSpPr>
+          <p:grpSpPr>
+            <a:xfrm rot="16200000">
+              <a:off x="2218021" y="2283730"/>
+              <a:ext cx="618738" cy="893134"/>
+              <a:chOff x="2324986" y="2449034"/>
+              <a:chExt cx="1834116" cy="2647503"/>
+            </a:xfrm>
+          </p:grpSpPr>
+          <p:cxnSp>
+            <p:nvCxnSpPr>
+              <p:cNvPr id="6" name="Connettore a gomito 5">
+                <a:extLst>
+                  <a:ext uri="{FF2B5EF4-FFF2-40B4-BE49-F238E27FC236}">
+                    <a16:creationId xmlns:a16="http://schemas.microsoft.com/office/drawing/2014/main" id="{9304BC83-0554-4484-BE6B-C63681ABEBE0}"/>
+                  </a:ext>
+                </a:extLst>
+              </p:cNvPr>
+              <p:cNvCxnSpPr>
+                <a:cxnSpLocks/>
+              </p:cNvCxnSpPr>
+              <p:nvPr/>
+            </p:nvCxnSpPr>
+            <p:spPr>
+              <a:xfrm flipH="1">
+                <a:off x="2936358" y="2449034"/>
+                <a:ext cx="1222744" cy="882501"/>
+              </a:xfrm>
+              <a:prstGeom prst="bentConnector3">
+                <a:avLst/>
+              </a:prstGeom>
+              <a:ln w="28575"/>
+            </p:spPr>
+            <p:style>
+              <a:lnRef idx="1">
+                <a:schemeClr val="accent1"/>
+              </a:lnRef>
+              <a:fillRef idx="0">
+                <a:schemeClr val="accent1"/>
+              </a:fillRef>
+              <a:effectRef idx="0">
+                <a:schemeClr val="accent1"/>
+              </a:effectRef>
+              <a:fontRef idx="minor">
+                <a:schemeClr val="tx1"/>
+              </a:fontRef>
+            </p:style>
+          </p:cxnSp>
+          <p:cxnSp>
+            <p:nvCxnSpPr>
+              <p:cNvPr id="7" name="Connettore a gomito 6">
+                <a:extLst>
+                  <a:ext uri="{FF2B5EF4-FFF2-40B4-BE49-F238E27FC236}">
+                    <a16:creationId xmlns:a16="http://schemas.microsoft.com/office/drawing/2014/main" id="{69A6A12D-98A3-4876-9850-4DE88B9E30E0}"/>
+                  </a:ext>
+                </a:extLst>
+              </p:cNvPr>
+              <p:cNvCxnSpPr>
+                <a:cxnSpLocks/>
+              </p:cNvCxnSpPr>
+              <p:nvPr/>
+            </p:nvCxnSpPr>
+            <p:spPr>
+              <a:xfrm flipH="1">
+                <a:off x="2324986" y="3331535"/>
+                <a:ext cx="1222744" cy="882501"/>
+              </a:xfrm>
+              <a:prstGeom prst="bentConnector3">
+                <a:avLst/>
+              </a:prstGeom>
+              <a:ln/>
+            </p:spPr>
+            <p:style>
+              <a:lnRef idx="1">
+                <a:schemeClr val="dk1"/>
+              </a:lnRef>
+              <a:fillRef idx="0">
+                <a:schemeClr val="dk1"/>
+              </a:fillRef>
+              <a:effectRef idx="0">
+                <a:schemeClr val="dk1"/>
+              </a:effectRef>
+              <a:fontRef idx="minor">
+                <a:schemeClr val="tx1"/>
+              </a:fontRef>
+            </p:style>
+          </p:cxnSp>
+          <p:cxnSp>
+            <p:nvCxnSpPr>
+              <p:cNvPr id="11" name="Connettore a gomito 10">
+                <a:extLst>
+                  <a:ext uri="{FF2B5EF4-FFF2-40B4-BE49-F238E27FC236}">
+                    <a16:creationId xmlns:a16="http://schemas.microsoft.com/office/drawing/2014/main" id="{9854EFD6-7237-4631-96C6-A404B3134DDD}"/>
+                  </a:ext>
+                </a:extLst>
+              </p:cNvPr>
+              <p:cNvCxnSpPr>
+                <a:cxnSpLocks/>
+              </p:cNvCxnSpPr>
+              <p:nvPr/>
+            </p:nvCxnSpPr>
+            <p:spPr>
+              <a:xfrm>
+                <a:off x="2324986" y="4214036"/>
+                <a:ext cx="1222744" cy="882501"/>
+              </a:xfrm>
+              <a:prstGeom prst="bentConnector3">
+                <a:avLst/>
+              </a:prstGeom>
+              <a:ln/>
+            </p:spPr>
+            <p:style>
+              <a:lnRef idx="1">
+                <a:schemeClr val="dk1"/>
+              </a:lnRef>
+              <a:fillRef idx="0">
+                <a:schemeClr val="dk1"/>
+              </a:fillRef>
+              <a:effectRef idx="0">
+                <a:schemeClr val="dk1"/>
+              </a:effectRef>
+              <a:fontRef idx="minor">
+                <a:schemeClr val="tx1"/>
+              </a:fontRef>
+            </p:style>
+          </p:cxnSp>
+          <p:cxnSp>
+            <p:nvCxnSpPr>
+              <p:cNvPr id="12" name="Connettore a gomito 11">
+                <a:extLst>
+                  <a:ext uri="{FF2B5EF4-FFF2-40B4-BE49-F238E27FC236}">
+                    <a16:creationId xmlns:a16="http://schemas.microsoft.com/office/drawing/2014/main" id="{0FC0D5E8-CF47-4E2C-A6D3-6FA57FBA70D2}"/>
+                  </a:ext>
+                </a:extLst>
+              </p:cNvPr>
+              <p:cNvCxnSpPr>
+                <a:cxnSpLocks/>
+              </p:cNvCxnSpPr>
+              <p:nvPr/>
+            </p:nvCxnSpPr>
+            <p:spPr>
+              <a:xfrm>
+                <a:off x="2936358" y="3331534"/>
+                <a:ext cx="1222744" cy="882501"/>
+              </a:xfrm>
+              <a:prstGeom prst="bentConnector3">
+                <a:avLst/>
+              </a:prstGeom>
+              <a:ln w="28575"/>
+            </p:spPr>
+            <p:style>
+              <a:lnRef idx="1">
+                <a:schemeClr val="accent1"/>
+              </a:lnRef>
+              <a:fillRef idx="0">
+                <a:schemeClr val="accent1"/>
+              </a:fillRef>
+              <a:effectRef idx="0">
+                <a:schemeClr val="accent1"/>
+              </a:effectRef>
+              <a:fontRef idx="minor">
+                <a:schemeClr val="tx1"/>
+              </a:fontRef>
+            </p:style>
+          </p:cxnSp>
+        </p:grpSp>
+        <p:cxnSp>
+          <p:nvCxnSpPr>
+            <p:cNvPr id="27" name="Connettore a gomito 26">
+              <a:extLst>
+                <a:ext uri="{FF2B5EF4-FFF2-40B4-BE49-F238E27FC236}">
+                  <a16:creationId xmlns:a16="http://schemas.microsoft.com/office/drawing/2014/main" id="{921A70E2-821B-4405-8A9E-B1E8C3C89551}"/>
+                </a:ext>
+              </a:extLst>
+            </p:cNvPr>
+            <p:cNvCxnSpPr>
+              <a:cxnSpLocks/>
+            </p:cNvCxnSpPr>
+            <p:nvPr/>
+          </p:nvCxnSpPr>
+          <p:spPr>
+            <a:xfrm rot="16200000">
+              <a:off x="3511991" y="2872449"/>
+              <a:ext cx="412492" cy="297711"/>
+            </a:xfrm>
+            <a:prstGeom prst="bentConnector3">
+              <a:avLst/>
+            </a:prstGeom>
+            <a:ln/>
+          </p:spPr>
+          <p:style>
+            <a:lnRef idx="1">
+              <a:schemeClr val="dk1"/>
+            </a:lnRef>
+            <a:fillRef idx="0">
+              <a:schemeClr val="dk1"/>
+            </a:fillRef>
+            <a:effectRef idx="0">
+              <a:schemeClr val="dk1"/>
+            </a:effectRef>
+            <a:fontRef idx="minor">
+              <a:schemeClr val="tx1"/>
+            </a:fontRef>
+          </p:style>
+        </p:cxnSp>
+        <p:cxnSp>
+          <p:nvCxnSpPr>
+            <p:cNvPr id="28" name="Connettore a gomito 27">
+              <a:extLst>
+                <a:ext uri="{FF2B5EF4-FFF2-40B4-BE49-F238E27FC236}">
+                  <a16:creationId xmlns:a16="http://schemas.microsoft.com/office/drawing/2014/main" id="{D4794B60-766C-4E2C-8F65-5A1E5A41C366}"/>
+                </a:ext>
+              </a:extLst>
+            </p:cNvPr>
+            <p:cNvCxnSpPr>
+              <a:cxnSpLocks/>
+            </p:cNvCxnSpPr>
+            <p:nvPr/>
+          </p:nvCxnSpPr>
+          <p:spPr>
+            <a:xfrm rot="16200000" flipH="1">
+              <a:off x="3511992" y="2684564"/>
+              <a:ext cx="412492" cy="297711"/>
+            </a:xfrm>
+            <a:prstGeom prst="bentConnector3">
+              <a:avLst/>
+            </a:prstGeom>
+            <a:ln/>
+          </p:spPr>
+          <p:style>
+            <a:lnRef idx="1">
+              <a:schemeClr val="dk1"/>
+            </a:lnRef>
+            <a:fillRef idx="0">
+              <a:schemeClr val="dk1"/>
+            </a:fillRef>
+            <a:effectRef idx="0">
+              <a:schemeClr val="dk1"/>
+            </a:effectRef>
+            <a:fontRef idx="minor">
+              <a:schemeClr val="tx1"/>
+            </a:fontRef>
+          </p:style>
+        </p:cxnSp>
+        <p:cxnSp>
+          <p:nvCxnSpPr>
+            <p:cNvPr id="29" name="Connettore a gomito 28">
+              <a:extLst>
+                <a:ext uri="{FF2B5EF4-FFF2-40B4-BE49-F238E27FC236}">
+                  <a16:creationId xmlns:a16="http://schemas.microsoft.com/office/drawing/2014/main" id="{1BA6A687-3669-4878-B898-163D0CBBB438}"/>
+                </a:ext>
+              </a:extLst>
+            </p:cNvPr>
+            <p:cNvCxnSpPr>
+              <a:cxnSpLocks/>
+            </p:cNvCxnSpPr>
+            <p:nvPr/>
+          </p:nvCxnSpPr>
+          <p:spPr>
+            <a:xfrm rot="16200000">
+              <a:off x="3809703" y="2684564"/>
+              <a:ext cx="412492" cy="297711"/>
+            </a:xfrm>
+            <a:prstGeom prst="bentConnector3">
+              <a:avLst/>
+            </a:prstGeom>
+            <a:ln/>
+          </p:spPr>
+          <p:style>
+            <a:lnRef idx="1">
+              <a:schemeClr val="dk1"/>
+            </a:lnRef>
+            <a:fillRef idx="0">
+              <a:schemeClr val="dk1"/>
+            </a:fillRef>
+            <a:effectRef idx="0">
+              <a:schemeClr val="dk1"/>
+            </a:effectRef>
+            <a:fontRef idx="minor">
+              <a:schemeClr val="tx1"/>
+            </a:fontRef>
+          </p:style>
+        </p:cxnSp>
+        <p:cxnSp>
+          <p:nvCxnSpPr>
+            <p:cNvPr id="30" name="Connettore a gomito 29">
+              <a:extLst>
+                <a:ext uri="{FF2B5EF4-FFF2-40B4-BE49-F238E27FC236}">
+                  <a16:creationId xmlns:a16="http://schemas.microsoft.com/office/drawing/2014/main" id="{5C08838B-8CC0-44B1-93DB-0A29CAF080E6}"/>
+                </a:ext>
+              </a:extLst>
+            </p:cNvPr>
+            <p:cNvCxnSpPr>
+              <a:cxnSpLocks/>
+            </p:cNvCxnSpPr>
+            <p:nvPr/>
+          </p:nvCxnSpPr>
+          <p:spPr>
+            <a:xfrm rot="16200000" flipH="1">
+              <a:off x="3214280" y="2452604"/>
+              <a:ext cx="412492" cy="297711"/>
+            </a:xfrm>
+            <a:prstGeom prst="bentConnector3">
+              <a:avLst/>
+            </a:prstGeom>
+            <a:ln/>
+          </p:spPr>
+          <p:style>
+            <a:lnRef idx="1">
+              <a:schemeClr val="dk1"/>
+            </a:lnRef>
+            <a:fillRef idx="0">
+              <a:schemeClr val="dk1"/>
+            </a:fillRef>
+            <a:effectRef idx="0">
+              <a:schemeClr val="dk1"/>
+            </a:effectRef>
+            <a:fontRef idx="minor">
+              <a:schemeClr val="tx1"/>
+            </a:fontRef>
+          </p:style>
+        </p:cxnSp>
+        <p:cxnSp>
+          <p:nvCxnSpPr>
+            <p:cNvPr id="31" name="Connettore a gomito 30">
+              <a:extLst>
+                <a:ext uri="{FF2B5EF4-FFF2-40B4-BE49-F238E27FC236}">
+                  <a16:creationId xmlns:a16="http://schemas.microsoft.com/office/drawing/2014/main" id="{153F16B3-0B62-471B-A076-734FB3354CFC}"/>
+                </a:ext>
+              </a:extLst>
+            </p:cNvPr>
+            <p:cNvCxnSpPr>
+              <a:cxnSpLocks/>
+            </p:cNvCxnSpPr>
+            <p:nvPr/>
+          </p:nvCxnSpPr>
+          <p:spPr>
+            <a:xfrm rot="16200000">
+              <a:off x="3511991" y="2452604"/>
+              <a:ext cx="412492" cy="297711"/>
+            </a:xfrm>
+            <a:prstGeom prst="bentConnector3">
+              <a:avLst/>
+            </a:prstGeom>
+            <a:ln/>
+          </p:spPr>
+          <p:style>
+            <a:lnRef idx="1">
+              <a:schemeClr val="dk1"/>
+            </a:lnRef>
+            <a:fillRef idx="0">
+              <a:schemeClr val="dk1"/>
+            </a:fillRef>
+            <a:effectRef idx="0">
+              <a:schemeClr val="dk1"/>
+            </a:effectRef>
+            <a:fontRef idx="minor">
+              <a:schemeClr val="tx1"/>
+            </a:fontRef>
+          </p:style>
+        </p:cxnSp>
+      </p:grpSp>
+      <p:grpSp>
+        <p:nvGrpSpPr>
+          <p:cNvPr id="33" name="Gruppo 32">
+            <a:extLst>
+              <a:ext uri="{FF2B5EF4-FFF2-40B4-BE49-F238E27FC236}">
+                <a16:creationId xmlns:a16="http://schemas.microsoft.com/office/drawing/2014/main" id="{E56CC520-F3FE-4098-9DD6-9DB3D14A6B8C}"/>
+              </a:ext>
+            </a:extLst>
+          </p:cNvPr>
+          <p:cNvGrpSpPr/>
+          <p:nvPr/>
+        </p:nvGrpSpPr>
+        <p:grpSpPr>
+          <a:xfrm flipH="1">
+            <a:off x="4657446" y="2477546"/>
+            <a:ext cx="1826454" cy="932777"/>
+            <a:chOff x="2080823" y="2395214"/>
+            <a:chExt cx="2083981" cy="1064297"/>
+          </a:xfrm>
+        </p:grpSpPr>
+        <p:cxnSp>
+          <p:nvCxnSpPr>
+            <p:cNvPr id="34" name="Connettore a gomito 33">
+              <a:extLst>
+                <a:ext uri="{FF2B5EF4-FFF2-40B4-BE49-F238E27FC236}">
+                  <a16:creationId xmlns:a16="http://schemas.microsoft.com/office/drawing/2014/main" id="{B7ECE95D-44BC-42CE-8244-5EA50F510B8B}"/>
+                </a:ext>
+              </a:extLst>
+            </p:cNvPr>
+            <p:cNvCxnSpPr>
+              <a:cxnSpLocks/>
+            </p:cNvCxnSpPr>
+            <p:nvPr/>
+          </p:nvCxnSpPr>
+          <p:spPr>
+            <a:xfrm rot="16200000" flipH="1">
+              <a:off x="2618857" y="2898163"/>
+              <a:ext cx="412492" cy="297711"/>
+            </a:xfrm>
+            <a:prstGeom prst="bentConnector3">
+              <a:avLst/>
+            </a:prstGeom>
+            <a:ln/>
+          </p:spPr>
+          <p:style>
+            <a:lnRef idx="1">
+              <a:schemeClr val="dk1"/>
+            </a:lnRef>
+            <a:fillRef idx="0">
+              <a:schemeClr val="dk1"/>
+            </a:fillRef>
+            <a:effectRef idx="0">
+              <a:schemeClr val="dk1"/>
+            </a:effectRef>
+            <a:fontRef idx="minor">
+              <a:schemeClr val="tx1"/>
+            </a:fontRef>
+          </p:style>
+        </p:cxnSp>
+        <p:cxnSp>
+          <p:nvCxnSpPr>
+            <p:cNvPr id="35" name="Connettore a gomito 34">
+              <a:extLst>
+                <a:ext uri="{FF2B5EF4-FFF2-40B4-BE49-F238E27FC236}">
+                  <a16:creationId xmlns:a16="http://schemas.microsoft.com/office/drawing/2014/main" id="{A85A6D13-4089-4B48-9C29-0E8664D1F27C}"/>
+                </a:ext>
+              </a:extLst>
+            </p:cNvPr>
+            <p:cNvCxnSpPr>
+              <a:cxnSpLocks/>
+            </p:cNvCxnSpPr>
+            <p:nvPr/>
+          </p:nvCxnSpPr>
+          <p:spPr>
+            <a:xfrm rot="16200000" flipH="1">
+              <a:off x="2916568" y="3104409"/>
+              <a:ext cx="412492" cy="297711"/>
+            </a:xfrm>
+            <a:prstGeom prst="bentConnector3">
+              <a:avLst/>
+            </a:prstGeom>
+            <a:ln/>
+          </p:spPr>
+          <p:style>
+            <a:lnRef idx="1">
+              <a:schemeClr val="dk1"/>
+            </a:lnRef>
+            <a:fillRef idx="0">
+              <a:schemeClr val="dk1"/>
+            </a:fillRef>
+            <a:effectRef idx="0">
+              <a:schemeClr val="dk1"/>
+            </a:effectRef>
+            <a:fontRef idx="minor">
+              <a:schemeClr val="tx1"/>
+            </a:fontRef>
+          </p:style>
+        </p:cxnSp>
+        <p:cxnSp>
+          <p:nvCxnSpPr>
+            <p:cNvPr id="36" name="Connettore a gomito 35">
+              <a:extLst>
+                <a:ext uri="{FF2B5EF4-FFF2-40B4-BE49-F238E27FC236}">
+                  <a16:creationId xmlns:a16="http://schemas.microsoft.com/office/drawing/2014/main" id="{853777AF-2FFD-4343-8A80-ED6F9BC5F6EE}"/>
+                </a:ext>
+              </a:extLst>
+            </p:cNvPr>
+            <p:cNvCxnSpPr>
+              <a:cxnSpLocks/>
+            </p:cNvCxnSpPr>
+            <p:nvPr/>
+          </p:nvCxnSpPr>
+          <p:spPr>
+            <a:xfrm rot="16200000">
+              <a:off x="3214280" y="3104409"/>
+              <a:ext cx="412492" cy="297711"/>
+            </a:xfrm>
+            <a:prstGeom prst="bentConnector3">
+              <a:avLst/>
+            </a:prstGeom>
+            <a:ln/>
+          </p:spPr>
+          <p:style>
+            <a:lnRef idx="1">
+              <a:schemeClr val="dk1"/>
+            </a:lnRef>
+            <a:fillRef idx="0">
+              <a:schemeClr val="dk1"/>
+            </a:fillRef>
+            <a:effectRef idx="0">
+              <a:schemeClr val="dk1"/>
+            </a:effectRef>
+            <a:fontRef idx="minor">
+              <a:schemeClr val="tx1"/>
+            </a:fontRef>
+          </p:style>
+        </p:cxnSp>
+        <p:cxnSp>
+          <p:nvCxnSpPr>
+            <p:cNvPr id="37" name="Connettore a gomito 36">
+              <a:extLst>
+                <a:ext uri="{FF2B5EF4-FFF2-40B4-BE49-F238E27FC236}">
+                  <a16:creationId xmlns:a16="http://schemas.microsoft.com/office/drawing/2014/main" id="{7BC25D10-CF3B-4506-9DCB-FDD2891E81B7}"/>
+                </a:ext>
+              </a:extLst>
+            </p:cNvPr>
+            <p:cNvCxnSpPr>
+              <a:cxnSpLocks/>
+            </p:cNvCxnSpPr>
+            <p:nvPr/>
+          </p:nvCxnSpPr>
+          <p:spPr>
+            <a:xfrm rot="16200000">
+              <a:off x="2916568" y="2898163"/>
+              <a:ext cx="412492" cy="297711"/>
+            </a:xfrm>
+            <a:prstGeom prst="bentConnector3">
+              <a:avLst/>
+            </a:prstGeom>
+            <a:ln/>
+          </p:spPr>
+          <p:style>
+            <a:lnRef idx="1">
+              <a:schemeClr val="dk1"/>
+            </a:lnRef>
+            <a:fillRef idx="0">
+              <a:schemeClr val="dk1"/>
+            </a:fillRef>
+            <a:effectRef idx="0">
+              <a:schemeClr val="dk1"/>
+            </a:effectRef>
+            <a:fontRef idx="minor">
+              <a:schemeClr val="tx1"/>
+            </a:fontRef>
+          </p:style>
+        </p:cxnSp>
+        <p:grpSp>
+          <p:nvGrpSpPr>
+            <p:cNvPr id="38" name="Gruppo 37">
+              <a:extLst>
+                <a:ext uri="{FF2B5EF4-FFF2-40B4-BE49-F238E27FC236}">
+                  <a16:creationId xmlns:a16="http://schemas.microsoft.com/office/drawing/2014/main" id="{9B1DAB63-47B4-4032-B1E3-6B90F1DE1F06}"/>
+                </a:ext>
+              </a:extLst>
+            </p:cNvPr>
+            <p:cNvGrpSpPr/>
+            <p:nvPr/>
+          </p:nvGrpSpPr>
+          <p:grpSpPr>
+            <a:xfrm rot="16200000">
+              <a:off x="2218021" y="2283730"/>
+              <a:ext cx="618738" cy="893134"/>
+              <a:chOff x="2324986" y="2449034"/>
+              <a:chExt cx="1834116" cy="2647503"/>
+            </a:xfrm>
+          </p:grpSpPr>
+          <p:cxnSp>
+            <p:nvCxnSpPr>
+              <p:cNvPr id="44" name="Connettore a gomito 43">
+                <a:extLst>
+                  <a:ext uri="{FF2B5EF4-FFF2-40B4-BE49-F238E27FC236}">
+                    <a16:creationId xmlns:a16="http://schemas.microsoft.com/office/drawing/2014/main" id="{AE9BF937-AAC2-4222-9904-7B95E08A04EA}"/>
+                  </a:ext>
+                </a:extLst>
+              </p:cNvPr>
+              <p:cNvCxnSpPr>
+                <a:cxnSpLocks/>
+              </p:cNvCxnSpPr>
+              <p:nvPr/>
+            </p:nvCxnSpPr>
+            <p:spPr>
+              <a:xfrm flipH="1">
+                <a:off x="2936358" y="2449034"/>
+                <a:ext cx="1222744" cy="882501"/>
+              </a:xfrm>
+              <a:prstGeom prst="bentConnector3">
+                <a:avLst/>
+              </a:prstGeom>
+              <a:ln w="28575"/>
+            </p:spPr>
+            <p:style>
+              <a:lnRef idx="1">
+                <a:schemeClr val="accent2"/>
+              </a:lnRef>
+              <a:fillRef idx="0">
+                <a:schemeClr val="accent2"/>
+              </a:fillRef>
+              <a:effectRef idx="0">
+                <a:schemeClr val="accent2"/>
+              </a:effectRef>
+              <a:fontRef idx="minor">
+                <a:schemeClr val="tx1"/>
+              </a:fontRef>
+            </p:style>
+          </p:cxnSp>
+          <p:cxnSp>
+            <p:nvCxnSpPr>
+              <p:cNvPr id="45" name="Connettore a gomito 44">
+                <a:extLst>
+                  <a:ext uri="{FF2B5EF4-FFF2-40B4-BE49-F238E27FC236}">
+                    <a16:creationId xmlns:a16="http://schemas.microsoft.com/office/drawing/2014/main" id="{E89684F8-74DC-484D-9CC2-255A2940BB13}"/>
+                  </a:ext>
+                </a:extLst>
+              </p:cNvPr>
+              <p:cNvCxnSpPr>
+                <a:cxnSpLocks/>
+              </p:cNvCxnSpPr>
+              <p:nvPr/>
+            </p:nvCxnSpPr>
+            <p:spPr>
+              <a:xfrm flipH="1">
+                <a:off x="2324986" y="3331535"/>
+                <a:ext cx="1222744" cy="882501"/>
+              </a:xfrm>
+              <a:prstGeom prst="bentConnector3">
+                <a:avLst/>
+              </a:prstGeom>
+              <a:ln/>
+            </p:spPr>
+            <p:style>
+              <a:lnRef idx="1">
+                <a:schemeClr val="dk1"/>
+              </a:lnRef>
+              <a:fillRef idx="0">
+                <a:schemeClr val="dk1"/>
+              </a:fillRef>
+              <a:effectRef idx="0">
+                <a:schemeClr val="dk1"/>
+              </a:effectRef>
+              <a:fontRef idx="minor">
+                <a:schemeClr val="tx1"/>
+              </a:fontRef>
+            </p:style>
+          </p:cxnSp>
+          <p:cxnSp>
+            <p:nvCxnSpPr>
+              <p:cNvPr id="46" name="Connettore a gomito 45">
+                <a:extLst>
+                  <a:ext uri="{FF2B5EF4-FFF2-40B4-BE49-F238E27FC236}">
+                    <a16:creationId xmlns:a16="http://schemas.microsoft.com/office/drawing/2014/main" id="{BA82B27C-BED4-400B-81C6-8DC4E3C88F1B}"/>
+                  </a:ext>
+                </a:extLst>
+              </p:cNvPr>
+              <p:cNvCxnSpPr>
+                <a:cxnSpLocks/>
+              </p:cNvCxnSpPr>
+              <p:nvPr/>
+            </p:nvCxnSpPr>
+            <p:spPr>
+              <a:xfrm>
+                <a:off x="2324986" y="4214036"/>
+                <a:ext cx="1222744" cy="882501"/>
+              </a:xfrm>
+              <a:prstGeom prst="bentConnector3">
+                <a:avLst/>
+              </a:prstGeom>
+              <a:ln/>
+            </p:spPr>
+            <p:style>
+              <a:lnRef idx="1">
+                <a:schemeClr val="dk1"/>
+              </a:lnRef>
+              <a:fillRef idx="0">
+                <a:schemeClr val="dk1"/>
+              </a:fillRef>
+              <a:effectRef idx="0">
+                <a:schemeClr val="dk1"/>
+              </a:effectRef>
+              <a:fontRef idx="minor">
+                <a:schemeClr val="tx1"/>
+              </a:fontRef>
+            </p:style>
+          </p:cxnSp>
+          <p:cxnSp>
+            <p:nvCxnSpPr>
+              <p:cNvPr id="47" name="Connettore a gomito 46">
+                <a:extLst>
+                  <a:ext uri="{FF2B5EF4-FFF2-40B4-BE49-F238E27FC236}">
+                    <a16:creationId xmlns:a16="http://schemas.microsoft.com/office/drawing/2014/main" id="{27D45DC8-92C3-49FF-B433-CC8EF7BC60C5}"/>
+                  </a:ext>
+                </a:extLst>
+              </p:cNvPr>
+              <p:cNvCxnSpPr>
+                <a:cxnSpLocks/>
+              </p:cNvCxnSpPr>
+              <p:nvPr/>
+            </p:nvCxnSpPr>
+            <p:spPr>
+              <a:xfrm>
+                <a:off x="2936358" y="3331534"/>
+                <a:ext cx="1222744" cy="882501"/>
+              </a:xfrm>
+              <a:prstGeom prst="bentConnector3">
+                <a:avLst/>
+              </a:prstGeom>
+              <a:ln w="28575"/>
+            </p:spPr>
+            <p:style>
+              <a:lnRef idx="1">
+                <a:schemeClr val="accent2"/>
+              </a:lnRef>
+              <a:fillRef idx="0">
+                <a:schemeClr val="accent2"/>
+              </a:fillRef>
+              <a:effectRef idx="0">
+                <a:schemeClr val="accent2"/>
+              </a:effectRef>
+              <a:fontRef idx="minor">
+                <a:schemeClr val="tx1"/>
+              </a:fontRef>
+            </p:style>
+          </p:cxnSp>
+        </p:grpSp>
+        <p:cxnSp>
+          <p:nvCxnSpPr>
+            <p:cNvPr id="39" name="Connettore a gomito 38">
+              <a:extLst>
+                <a:ext uri="{FF2B5EF4-FFF2-40B4-BE49-F238E27FC236}">
+                  <a16:creationId xmlns:a16="http://schemas.microsoft.com/office/drawing/2014/main" id="{1EE7206F-53B7-415C-9197-F77B6E3B532B}"/>
+                </a:ext>
+              </a:extLst>
+            </p:cNvPr>
+            <p:cNvCxnSpPr>
+              <a:cxnSpLocks/>
+            </p:cNvCxnSpPr>
+            <p:nvPr/>
+          </p:nvCxnSpPr>
+          <p:spPr>
+            <a:xfrm rot="16200000">
+              <a:off x="3511991" y="2872449"/>
+              <a:ext cx="412492" cy="297711"/>
+            </a:xfrm>
+            <a:prstGeom prst="bentConnector3">
+              <a:avLst/>
+            </a:prstGeom>
+            <a:ln/>
+          </p:spPr>
+          <p:style>
+            <a:lnRef idx="1">
+              <a:schemeClr val="dk1"/>
+            </a:lnRef>
+            <a:fillRef idx="0">
+              <a:schemeClr val="dk1"/>
+            </a:fillRef>
+            <a:effectRef idx="0">
+              <a:schemeClr val="dk1"/>
+            </a:effectRef>
+            <a:fontRef idx="minor">
+              <a:schemeClr val="tx1"/>
+            </a:fontRef>
+          </p:style>
+        </p:cxnSp>
+        <p:cxnSp>
+          <p:nvCxnSpPr>
+            <p:cNvPr id="40" name="Connettore a gomito 39">
+              <a:extLst>
+                <a:ext uri="{FF2B5EF4-FFF2-40B4-BE49-F238E27FC236}">
+                  <a16:creationId xmlns:a16="http://schemas.microsoft.com/office/drawing/2014/main" id="{0D8B764B-F79A-46E2-BA89-27A6102CBADD}"/>
+                </a:ext>
+              </a:extLst>
+            </p:cNvPr>
+            <p:cNvCxnSpPr>
+              <a:cxnSpLocks/>
+            </p:cNvCxnSpPr>
+            <p:nvPr/>
+          </p:nvCxnSpPr>
+          <p:spPr>
+            <a:xfrm rot="16200000" flipH="1">
+              <a:off x="3511992" y="2684564"/>
+              <a:ext cx="412492" cy="297711"/>
+            </a:xfrm>
+            <a:prstGeom prst="bentConnector3">
+              <a:avLst/>
+            </a:prstGeom>
+            <a:ln/>
+          </p:spPr>
+          <p:style>
+            <a:lnRef idx="1">
+              <a:schemeClr val="dk1"/>
+            </a:lnRef>
+            <a:fillRef idx="0">
+              <a:schemeClr val="dk1"/>
+            </a:fillRef>
+            <a:effectRef idx="0">
+              <a:schemeClr val="dk1"/>
+            </a:effectRef>
+            <a:fontRef idx="minor">
+              <a:schemeClr val="tx1"/>
+            </a:fontRef>
+          </p:style>
+        </p:cxnSp>
+        <p:cxnSp>
+          <p:nvCxnSpPr>
+            <p:cNvPr id="41" name="Connettore a gomito 40">
+              <a:extLst>
+                <a:ext uri="{FF2B5EF4-FFF2-40B4-BE49-F238E27FC236}">
+                  <a16:creationId xmlns:a16="http://schemas.microsoft.com/office/drawing/2014/main" id="{7BF935AE-18BF-41EF-A65B-45BEAD56EB5C}"/>
+                </a:ext>
+              </a:extLst>
+            </p:cNvPr>
+            <p:cNvCxnSpPr>
+              <a:cxnSpLocks/>
+            </p:cNvCxnSpPr>
+            <p:nvPr/>
+          </p:nvCxnSpPr>
+          <p:spPr>
+            <a:xfrm rot="16200000">
+              <a:off x="3809703" y="2684564"/>
+              <a:ext cx="412492" cy="297711"/>
+            </a:xfrm>
+            <a:prstGeom prst="bentConnector3">
+              <a:avLst/>
+            </a:prstGeom>
+            <a:ln/>
+          </p:spPr>
+          <p:style>
+            <a:lnRef idx="1">
+              <a:schemeClr val="dk1"/>
+            </a:lnRef>
+            <a:fillRef idx="0">
+              <a:schemeClr val="dk1"/>
+            </a:fillRef>
+            <a:effectRef idx="0">
+              <a:schemeClr val="dk1"/>
+            </a:effectRef>
+            <a:fontRef idx="minor">
+              <a:schemeClr val="tx1"/>
+            </a:fontRef>
+          </p:style>
+        </p:cxnSp>
+        <p:cxnSp>
+          <p:nvCxnSpPr>
+            <p:cNvPr id="42" name="Connettore a gomito 41">
+              <a:extLst>
+                <a:ext uri="{FF2B5EF4-FFF2-40B4-BE49-F238E27FC236}">
+                  <a16:creationId xmlns:a16="http://schemas.microsoft.com/office/drawing/2014/main" id="{E3782B7D-3494-4154-95A3-F88E89063349}"/>
+                </a:ext>
+              </a:extLst>
+            </p:cNvPr>
+            <p:cNvCxnSpPr>
+              <a:cxnSpLocks/>
+            </p:cNvCxnSpPr>
+            <p:nvPr/>
+          </p:nvCxnSpPr>
+          <p:spPr>
+            <a:xfrm rot="16200000" flipH="1">
+              <a:off x="3214280" y="2452604"/>
+              <a:ext cx="412492" cy="297711"/>
+            </a:xfrm>
+            <a:prstGeom prst="bentConnector3">
+              <a:avLst/>
+            </a:prstGeom>
+            <a:ln/>
+          </p:spPr>
+          <p:style>
+            <a:lnRef idx="1">
+              <a:schemeClr val="dk1"/>
+            </a:lnRef>
+            <a:fillRef idx="0">
+              <a:schemeClr val="dk1"/>
+            </a:fillRef>
+            <a:effectRef idx="0">
+              <a:schemeClr val="dk1"/>
+            </a:effectRef>
+            <a:fontRef idx="minor">
+              <a:schemeClr val="tx1"/>
+            </a:fontRef>
+          </p:style>
+        </p:cxnSp>
+        <p:cxnSp>
+          <p:nvCxnSpPr>
+            <p:cNvPr id="43" name="Connettore a gomito 42">
+              <a:extLst>
+                <a:ext uri="{FF2B5EF4-FFF2-40B4-BE49-F238E27FC236}">
+                  <a16:creationId xmlns:a16="http://schemas.microsoft.com/office/drawing/2014/main" id="{CBB26C3B-5243-43F0-BDBA-3F5D0012E344}"/>
+                </a:ext>
+              </a:extLst>
+            </p:cNvPr>
+            <p:cNvCxnSpPr>
+              <a:cxnSpLocks/>
+            </p:cNvCxnSpPr>
+            <p:nvPr/>
+          </p:nvCxnSpPr>
+          <p:spPr>
+            <a:xfrm rot="16200000">
+              <a:off x="3511991" y="2452604"/>
+              <a:ext cx="412492" cy="297711"/>
+            </a:xfrm>
+            <a:prstGeom prst="bentConnector3">
+              <a:avLst/>
+            </a:prstGeom>
+            <a:ln/>
+          </p:spPr>
+          <p:style>
+            <a:lnRef idx="1">
+              <a:schemeClr val="dk1"/>
+            </a:lnRef>
+            <a:fillRef idx="0">
+              <a:schemeClr val="dk1"/>
+            </a:fillRef>
+            <a:effectRef idx="0">
+              <a:schemeClr val="dk1"/>
+            </a:effectRef>
+            <a:fontRef idx="minor">
+              <a:schemeClr val="tx1"/>
+            </a:fontRef>
+          </p:style>
+        </p:cxnSp>
+      </p:grpSp>
+      <p:grpSp>
+        <p:nvGrpSpPr>
+          <p:cNvPr id="48" name="Gruppo 47">
+            <a:extLst>
+              <a:ext uri="{FF2B5EF4-FFF2-40B4-BE49-F238E27FC236}">
+                <a16:creationId xmlns:a16="http://schemas.microsoft.com/office/drawing/2014/main" id="{4ACE0472-5A42-476D-B1D3-A7269FAA6EF5}"/>
+              </a:ext>
+            </a:extLst>
+          </p:cNvPr>
+          <p:cNvGrpSpPr/>
+          <p:nvPr/>
+        </p:nvGrpSpPr>
+        <p:grpSpPr>
+          <a:xfrm flipH="1">
+            <a:off x="7494990" y="2477545"/>
+            <a:ext cx="1826454" cy="932777"/>
+            <a:chOff x="2080823" y="2395214"/>
+            <a:chExt cx="2083981" cy="1064297"/>
+          </a:xfrm>
+        </p:grpSpPr>
+        <p:cxnSp>
+          <p:nvCxnSpPr>
+            <p:cNvPr id="49" name="Connettore a gomito 48">
+              <a:extLst>
+                <a:ext uri="{FF2B5EF4-FFF2-40B4-BE49-F238E27FC236}">
+                  <a16:creationId xmlns:a16="http://schemas.microsoft.com/office/drawing/2014/main" id="{AAA5EB97-2586-41DC-A142-B69499FA3BE8}"/>
+                </a:ext>
+              </a:extLst>
+            </p:cNvPr>
+            <p:cNvCxnSpPr>
+              <a:cxnSpLocks/>
+            </p:cNvCxnSpPr>
+            <p:nvPr/>
+          </p:nvCxnSpPr>
+          <p:spPr>
+            <a:xfrm rot="16200000" flipH="1">
+              <a:off x="2618857" y="2898163"/>
+              <a:ext cx="412492" cy="297711"/>
+            </a:xfrm>
+            <a:prstGeom prst="bentConnector3">
+              <a:avLst/>
+            </a:prstGeom>
+            <a:ln/>
+          </p:spPr>
+          <p:style>
+            <a:lnRef idx="1">
+              <a:schemeClr val="dk1"/>
+            </a:lnRef>
+            <a:fillRef idx="0">
+              <a:schemeClr val="dk1"/>
+            </a:fillRef>
+            <a:effectRef idx="0">
+              <a:schemeClr val="dk1"/>
+            </a:effectRef>
+            <a:fontRef idx="minor">
+              <a:schemeClr val="tx1"/>
+            </a:fontRef>
+          </p:style>
+        </p:cxnSp>
+        <p:cxnSp>
+          <p:nvCxnSpPr>
+            <p:cNvPr id="50" name="Connettore a gomito 49">
+              <a:extLst>
+                <a:ext uri="{FF2B5EF4-FFF2-40B4-BE49-F238E27FC236}">
+                  <a16:creationId xmlns:a16="http://schemas.microsoft.com/office/drawing/2014/main" id="{F0377437-76C0-4FBC-BA9A-94B30CF5BFE0}"/>
+                </a:ext>
+              </a:extLst>
+            </p:cNvPr>
+            <p:cNvCxnSpPr>
+              <a:cxnSpLocks/>
+            </p:cNvCxnSpPr>
+            <p:nvPr/>
+          </p:nvCxnSpPr>
+          <p:spPr>
+            <a:xfrm rot="16200000" flipH="1">
+              <a:off x="2916568" y="3104409"/>
+              <a:ext cx="412492" cy="297711"/>
+            </a:xfrm>
+            <a:prstGeom prst="bentConnector3">
+              <a:avLst/>
+            </a:prstGeom>
+            <a:ln/>
+          </p:spPr>
+          <p:style>
+            <a:lnRef idx="1">
+              <a:schemeClr val="dk1"/>
+            </a:lnRef>
+            <a:fillRef idx="0">
+              <a:schemeClr val="dk1"/>
+            </a:fillRef>
+            <a:effectRef idx="0">
+              <a:schemeClr val="dk1"/>
+            </a:effectRef>
+            <a:fontRef idx="minor">
+              <a:schemeClr val="tx1"/>
+            </a:fontRef>
+          </p:style>
+        </p:cxnSp>
+        <p:cxnSp>
+          <p:nvCxnSpPr>
+            <p:cNvPr id="51" name="Connettore a gomito 50">
+              <a:extLst>
+                <a:ext uri="{FF2B5EF4-FFF2-40B4-BE49-F238E27FC236}">
+                  <a16:creationId xmlns:a16="http://schemas.microsoft.com/office/drawing/2014/main" id="{A561BE9B-B05B-427B-AE8C-DB671FB57B6A}"/>
+                </a:ext>
+              </a:extLst>
+            </p:cNvPr>
+            <p:cNvCxnSpPr>
+              <a:cxnSpLocks/>
+            </p:cNvCxnSpPr>
+            <p:nvPr/>
+          </p:nvCxnSpPr>
+          <p:spPr>
+            <a:xfrm rot="16200000">
+              <a:off x="3214280" y="3104409"/>
+              <a:ext cx="412492" cy="297711"/>
+            </a:xfrm>
+            <a:prstGeom prst="bentConnector3">
+              <a:avLst/>
+            </a:prstGeom>
+            <a:ln/>
+          </p:spPr>
+          <p:style>
+            <a:lnRef idx="1">
+              <a:schemeClr val="dk1"/>
+            </a:lnRef>
+            <a:fillRef idx="0">
+              <a:schemeClr val="dk1"/>
+            </a:fillRef>
+            <a:effectRef idx="0">
+              <a:schemeClr val="dk1"/>
+            </a:effectRef>
+            <a:fontRef idx="minor">
+              <a:schemeClr val="tx1"/>
+            </a:fontRef>
+          </p:style>
+        </p:cxnSp>
+        <p:cxnSp>
+          <p:nvCxnSpPr>
+            <p:cNvPr id="52" name="Connettore a gomito 51">
+              <a:extLst>
+                <a:ext uri="{FF2B5EF4-FFF2-40B4-BE49-F238E27FC236}">
+                  <a16:creationId xmlns:a16="http://schemas.microsoft.com/office/drawing/2014/main" id="{CCED8DAA-7523-4AE6-95F3-036776E72F5B}"/>
+                </a:ext>
+              </a:extLst>
+            </p:cNvPr>
+            <p:cNvCxnSpPr>
+              <a:cxnSpLocks/>
+            </p:cNvCxnSpPr>
+            <p:nvPr/>
+          </p:nvCxnSpPr>
+          <p:spPr>
+            <a:xfrm rot="16200000">
+              <a:off x="2916568" y="2898163"/>
+              <a:ext cx="412492" cy="297711"/>
+            </a:xfrm>
+            <a:prstGeom prst="bentConnector3">
+              <a:avLst/>
+            </a:prstGeom>
+            <a:ln/>
+          </p:spPr>
+          <p:style>
+            <a:lnRef idx="1">
+              <a:schemeClr val="dk1"/>
+            </a:lnRef>
+            <a:fillRef idx="0">
+              <a:schemeClr val="dk1"/>
+            </a:fillRef>
+            <a:effectRef idx="0">
+              <a:schemeClr val="dk1"/>
+            </a:effectRef>
+            <a:fontRef idx="minor">
+              <a:schemeClr val="tx1"/>
+            </a:fontRef>
+          </p:style>
+        </p:cxnSp>
+        <p:grpSp>
+          <p:nvGrpSpPr>
+            <p:cNvPr id="53" name="Gruppo 52">
+              <a:extLst>
+                <a:ext uri="{FF2B5EF4-FFF2-40B4-BE49-F238E27FC236}">
+                  <a16:creationId xmlns:a16="http://schemas.microsoft.com/office/drawing/2014/main" id="{0EFA298B-942A-4644-9C22-6E88F614030E}"/>
+                </a:ext>
+              </a:extLst>
+            </p:cNvPr>
+            <p:cNvGrpSpPr/>
+            <p:nvPr/>
+          </p:nvGrpSpPr>
+          <p:grpSpPr>
+            <a:xfrm rot="16200000">
+              <a:off x="2218021" y="2283730"/>
+              <a:ext cx="618738" cy="893134"/>
+              <a:chOff x="2324986" y="2449034"/>
+              <a:chExt cx="1834116" cy="2647503"/>
+            </a:xfrm>
+          </p:grpSpPr>
+          <p:cxnSp>
+            <p:nvCxnSpPr>
+              <p:cNvPr id="59" name="Connettore a gomito 58">
+                <a:extLst>
+                  <a:ext uri="{FF2B5EF4-FFF2-40B4-BE49-F238E27FC236}">
+                    <a16:creationId xmlns:a16="http://schemas.microsoft.com/office/drawing/2014/main" id="{909FED97-FA01-4489-96D4-86A88175B027}"/>
+                  </a:ext>
+                </a:extLst>
+              </p:cNvPr>
+              <p:cNvCxnSpPr>
+                <a:cxnSpLocks/>
+              </p:cNvCxnSpPr>
+              <p:nvPr/>
+            </p:nvCxnSpPr>
+            <p:spPr>
+              <a:xfrm flipH="1">
+                <a:off x="2936358" y="2449034"/>
+                <a:ext cx="1222744" cy="882501"/>
+              </a:xfrm>
+              <a:prstGeom prst="bentConnector3">
+                <a:avLst/>
+              </a:prstGeom>
+              <a:ln w="28575"/>
+            </p:spPr>
+            <p:style>
+              <a:lnRef idx="2">
+                <a:schemeClr val="accent6"/>
+              </a:lnRef>
+              <a:fillRef idx="0">
+                <a:schemeClr val="accent6"/>
+              </a:fillRef>
+              <a:effectRef idx="1">
+                <a:schemeClr val="accent6"/>
+              </a:effectRef>
+              <a:fontRef idx="minor">
+                <a:schemeClr val="tx1"/>
+              </a:fontRef>
+            </p:style>
+          </p:cxnSp>
+          <p:cxnSp>
+            <p:nvCxnSpPr>
+              <p:cNvPr id="60" name="Connettore a gomito 59">
+                <a:extLst>
+                  <a:ext uri="{FF2B5EF4-FFF2-40B4-BE49-F238E27FC236}">
+                    <a16:creationId xmlns:a16="http://schemas.microsoft.com/office/drawing/2014/main" id="{34E7A6CD-01C8-4D5F-A131-89745DC1E703}"/>
+                  </a:ext>
+                </a:extLst>
+              </p:cNvPr>
+              <p:cNvCxnSpPr>
+                <a:cxnSpLocks/>
+              </p:cNvCxnSpPr>
+              <p:nvPr/>
+            </p:nvCxnSpPr>
+            <p:spPr>
+              <a:xfrm flipH="1">
+                <a:off x="2324986" y="3331535"/>
+                <a:ext cx="1222744" cy="882501"/>
+              </a:xfrm>
+              <a:prstGeom prst="bentConnector3">
+                <a:avLst/>
+              </a:prstGeom>
+              <a:ln/>
+            </p:spPr>
+            <p:style>
+              <a:lnRef idx="1">
+                <a:schemeClr val="dk1"/>
+              </a:lnRef>
+              <a:fillRef idx="0">
+                <a:schemeClr val="dk1"/>
+              </a:fillRef>
+              <a:effectRef idx="0">
+                <a:schemeClr val="dk1"/>
+              </a:effectRef>
+              <a:fontRef idx="minor">
+                <a:schemeClr val="tx1"/>
+              </a:fontRef>
+            </p:style>
+          </p:cxnSp>
+          <p:cxnSp>
+            <p:nvCxnSpPr>
+              <p:cNvPr id="61" name="Connettore a gomito 60">
+                <a:extLst>
+                  <a:ext uri="{FF2B5EF4-FFF2-40B4-BE49-F238E27FC236}">
+                    <a16:creationId xmlns:a16="http://schemas.microsoft.com/office/drawing/2014/main" id="{B6045CE7-C98E-4F08-97A6-538C74E9980A}"/>
+                  </a:ext>
+                </a:extLst>
+              </p:cNvPr>
+              <p:cNvCxnSpPr>
+                <a:cxnSpLocks/>
+              </p:cNvCxnSpPr>
+              <p:nvPr/>
+            </p:nvCxnSpPr>
+            <p:spPr>
+              <a:xfrm>
+                <a:off x="2324986" y="4214036"/>
+                <a:ext cx="1222744" cy="882501"/>
+              </a:xfrm>
+              <a:prstGeom prst="bentConnector3">
+                <a:avLst/>
+              </a:prstGeom>
+              <a:ln/>
+            </p:spPr>
+            <p:style>
+              <a:lnRef idx="1">
+                <a:schemeClr val="dk1"/>
+              </a:lnRef>
+              <a:fillRef idx="0">
+                <a:schemeClr val="dk1"/>
+              </a:fillRef>
+              <a:effectRef idx="0">
+                <a:schemeClr val="dk1"/>
+              </a:effectRef>
+              <a:fontRef idx="minor">
+                <a:schemeClr val="tx1"/>
+              </a:fontRef>
+            </p:style>
+          </p:cxnSp>
+          <p:cxnSp>
+            <p:nvCxnSpPr>
+              <p:cNvPr id="62" name="Connettore a gomito 61">
+                <a:extLst>
+                  <a:ext uri="{FF2B5EF4-FFF2-40B4-BE49-F238E27FC236}">
+                    <a16:creationId xmlns:a16="http://schemas.microsoft.com/office/drawing/2014/main" id="{7D1EB34B-8080-4213-A19B-7565AE6490F5}"/>
+                  </a:ext>
+                </a:extLst>
+              </p:cNvPr>
+              <p:cNvCxnSpPr>
+                <a:cxnSpLocks/>
+              </p:cNvCxnSpPr>
+              <p:nvPr/>
+            </p:nvCxnSpPr>
+            <p:spPr>
+              <a:xfrm>
+                <a:off x="2936358" y="3331534"/>
+                <a:ext cx="1222744" cy="882501"/>
+              </a:xfrm>
+              <a:prstGeom prst="bentConnector3">
+                <a:avLst/>
+              </a:prstGeom>
+              <a:ln w="28575"/>
+            </p:spPr>
+            <p:style>
+              <a:lnRef idx="2">
+                <a:schemeClr val="accent6"/>
+              </a:lnRef>
+              <a:fillRef idx="0">
+                <a:schemeClr val="accent6"/>
+              </a:fillRef>
+              <a:effectRef idx="1">
+                <a:schemeClr val="accent6"/>
+              </a:effectRef>
+              <a:fontRef idx="minor">
+                <a:schemeClr val="tx1"/>
+              </a:fontRef>
+            </p:style>
+          </p:cxnSp>
+        </p:grpSp>
+        <p:cxnSp>
+          <p:nvCxnSpPr>
+            <p:cNvPr id="54" name="Connettore a gomito 53">
+              <a:extLst>
+                <a:ext uri="{FF2B5EF4-FFF2-40B4-BE49-F238E27FC236}">
+                  <a16:creationId xmlns:a16="http://schemas.microsoft.com/office/drawing/2014/main" id="{60F5EBEC-9EA4-41FA-8BAA-6A4D5324C77A}"/>
+                </a:ext>
+              </a:extLst>
+            </p:cNvPr>
+            <p:cNvCxnSpPr>
+              <a:cxnSpLocks/>
+            </p:cNvCxnSpPr>
+            <p:nvPr/>
+          </p:nvCxnSpPr>
+          <p:spPr>
+            <a:xfrm rot="16200000">
+              <a:off x="3511991" y="2872449"/>
+              <a:ext cx="412492" cy="297711"/>
+            </a:xfrm>
+            <a:prstGeom prst="bentConnector3">
+              <a:avLst/>
+            </a:prstGeom>
+            <a:ln/>
+          </p:spPr>
+          <p:style>
+            <a:lnRef idx="1">
+              <a:schemeClr val="dk1"/>
+            </a:lnRef>
+            <a:fillRef idx="0">
+              <a:schemeClr val="dk1"/>
+            </a:fillRef>
+            <a:effectRef idx="0">
+              <a:schemeClr val="dk1"/>
+            </a:effectRef>
+            <a:fontRef idx="minor">
+              <a:schemeClr val="tx1"/>
+            </a:fontRef>
+          </p:style>
+        </p:cxnSp>
+        <p:cxnSp>
+          <p:nvCxnSpPr>
+            <p:cNvPr id="55" name="Connettore a gomito 54">
+              <a:extLst>
+                <a:ext uri="{FF2B5EF4-FFF2-40B4-BE49-F238E27FC236}">
+                  <a16:creationId xmlns:a16="http://schemas.microsoft.com/office/drawing/2014/main" id="{96918257-E01D-4004-950E-C75D4EB5C079}"/>
+                </a:ext>
+              </a:extLst>
+            </p:cNvPr>
+            <p:cNvCxnSpPr>
+              <a:cxnSpLocks/>
+            </p:cNvCxnSpPr>
+            <p:nvPr/>
+          </p:nvCxnSpPr>
+          <p:spPr>
+            <a:xfrm rot="16200000" flipH="1">
+              <a:off x="3511992" y="2684564"/>
+              <a:ext cx="412492" cy="297711"/>
+            </a:xfrm>
+            <a:prstGeom prst="bentConnector3">
+              <a:avLst/>
+            </a:prstGeom>
+            <a:ln/>
+          </p:spPr>
+          <p:style>
+            <a:lnRef idx="1">
+              <a:schemeClr val="dk1"/>
+            </a:lnRef>
+            <a:fillRef idx="0">
+              <a:schemeClr val="dk1"/>
+            </a:fillRef>
+            <a:effectRef idx="0">
+              <a:schemeClr val="dk1"/>
+            </a:effectRef>
+            <a:fontRef idx="minor">
+              <a:schemeClr val="tx1"/>
+            </a:fontRef>
+          </p:style>
+        </p:cxnSp>
+        <p:cxnSp>
+          <p:nvCxnSpPr>
+            <p:cNvPr id="56" name="Connettore a gomito 55">
+              <a:extLst>
+                <a:ext uri="{FF2B5EF4-FFF2-40B4-BE49-F238E27FC236}">
+                  <a16:creationId xmlns:a16="http://schemas.microsoft.com/office/drawing/2014/main" id="{66246318-229C-4634-82BB-9E1AE168D0C8}"/>
+                </a:ext>
+              </a:extLst>
+            </p:cNvPr>
+            <p:cNvCxnSpPr>
+              <a:cxnSpLocks/>
+            </p:cNvCxnSpPr>
+            <p:nvPr/>
+          </p:nvCxnSpPr>
+          <p:spPr>
+            <a:xfrm rot="16200000">
+              <a:off x="3809703" y="2684564"/>
+              <a:ext cx="412492" cy="297711"/>
+            </a:xfrm>
+            <a:prstGeom prst="bentConnector3">
+              <a:avLst/>
+            </a:prstGeom>
+            <a:ln/>
+          </p:spPr>
+          <p:style>
+            <a:lnRef idx="1">
+              <a:schemeClr val="dk1"/>
+            </a:lnRef>
+            <a:fillRef idx="0">
+              <a:schemeClr val="dk1"/>
+            </a:fillRef>
+            <a:effectRef idx="0">
+              <a:schemeClr val="dk1"/>
+            </a:effectRef>
+            <a:fontRef idx="minor">
+              <a:schemeClr val="tx1"/>
+            </a:fontRef>
+          </p:style>
+        </p:cxnSp>
+        <p:cxnSp>
+          <p:nvCxnSpPr>
+            <p:cNvPr id="57" name="Connettore a gomito 56">
+              <a:extLst>
+                <a:ext uri="{FF2B5EF4-FFF2-40B4-BE49-F238E27FC236}">
+                  <a16:creationId xmlns:a16="http://schemas.microsoft.com/office/drawing/2014/main" id="{6ADEE5F7-6BDE-417D-BA4B-3BF1098D30F4}"/>
+                </a:ext>
+              </a:extLst>
+            </p:cNvPr>
+            <p:cNvCxnSpPr>
+              <a:cxnSpLocks/>
+            </p:cNvCxnSpPr>
+            <p:nvPr/>
+          </p:nvCxnSpPr>
+          <p:spPr>
+            <a:xfrm rot="16200000" flipH="1">
+              <a:off x="3214280" y="2452604"/>
+              <a:ext cx="412492" cy="297711"/>
+            </a:xfrm>
+            <a:prstGeom prst="bentConnector3">
+              <a:avLst/>
+            </a:prstGeom>
+            <a:ln/>
+          </p:spPr>
+          <p:style>
+            <a:lnRef idx="1">
+              <a:schemeClr val="dk1"/>
+            </a:lnRef>
+            <a:fillRef idx="0">
+              <a:schemeClr val="dk1"/>
+            </a:fillRef>
+            <a:effectRef idx="0">
+              <a:schemeClr val="dk1"/>
+            </a:effectRef>
+            <a:fontRef idx="minor">
+              <a:schemeClr val="tx1"/>
+            </a:fontRef>
+          </p:style>
+        </p:cxnSp>
+        <p:cxnSp>
+          <p:nvCxnSpPr>
+            <p:cNvPr id="58" name="Connettore a gomito 57">
+              <a:extLst>
+                <a:ext uri="{FF2B5EF4-FFF2-40B4-BE49-F238E27FC236}">
+                  <a16:creationId xmlns:a16="http://schemas.microsoft.com/office/drawing/2014/main" id="{E71EA51C-DCEB-49F7-91EB-2DAE41C66C04}"/>
+                </a:ext>
+              </a:extLst>
+            </p:cNvPr>
+            <p:cNvCxnSpPr>
+              <a:cxnSpLocks/>
+            </p:cNvCxnSpPr>
+            <p:nvPr/>
+          </p:nvCxnSpPr>
+          <p:spPr>
+            <a:xfrm rot="16200000">
+              <a:off x="3511991" y="2452604"/>
+              <a:ext cx="412492" cy="297711"/>
+            </a:xfrm>
+            <a:prstGeom prst="bentConnector3">
+              <a:avLst/>
+            </a:prstGeom>
+            <a:ln/>
+          </p:spPr>
+          <p:style>
+            <a:lnRef idx="1">
+              <a:schemeClr val="dk1"/>
+            </a:lnRef>
+            <a:fillRef idx="0">
+              <a:schemeClr val="dk1"/>
+            </a:fillRef>
+            <a:effectRef idx="0">
+              <a:schemeClr val="dk1"/>
+            </a:effectRef>
+            <a:fontRef idx="minor">
+              <a:schemeClr val="tx1"/>
+            </a:fontRef>
+          </p:style>
+        </p:cxnSp>
+      </p:grpSp>
+    </p:spTree>
+    <p:extLst>
+      <p:ext uri="{BB962C8B-B14F-4D97-AF65-F5344CB8AC3E}">
+        <p14:creationId xmlns:p14="http://schemas.microsoft.com/office/powerpoint/2010/main" val="3315428409"/>
+      </p:ext>
+    </p:extLst>
+  </p:cSld>
+  <p:clrMapOvr>
+    <a:masterClrMapping/>
+  </p:clrMapOvr>
+</p:sld>
+</file>
+
+<file path=ppt/slides/slide5.xml><?xml version="1.0" encoding="utf-8"?>
+<p:sld xmlns:a="http://schemas.openxmlformats.org/drawingml/2006/main" xmlns:r="http://schemas.openxmlformats.org/officeDocument/2006/relationships" xmlns:p="http://schemas.openxmlformats.org/presentationml/2006/main">
+  <p:cSld>
+    <p:spTree>
+      <p:nvGrpSpPr>
+        <p:cNvPr id="1" name=""/>
+        <p:cNvGrpSpPr/>
+        <p:nvPr/>
+      </p:nvGrpSpPr>
+      <p:grpSpPr>
+        <a:xfrm>
+          <a:off x="0" y="0"/>
+          <a:ext cx="0" cy="0"/>
+          <a:chOff x="0" y="0"/>
+          <a:chExt cx="0" cy="0"/>
+        </a:xfrm>
+      </p:grpSpPr>
+      <p:grpSp>
+        <p:nvGrpSpPr>
+          <p:cNvPr id="4" name="Gruppo 3">
+            <a:extLst>
+              <a:ext uri="{FF2B5EF4-FFF2-40B4-BE49-F238E27FC236}">
+                <a16:creationId xmlns:a16="http://schemas.microsoft.com/office/drawing/2014/main" id="{09202E6A-94F4-4723-942E-4038738ACB1B}"/>
+              </a:ext>
+            </a:extLst>
+          </p:cNvPr>
+          <p:cNvGrpSpPr/>
+          <p:nvPr/>
+        </p:nvGrpSpPr>
+        <p:grpSpPr>
+          <a:xfrm>
+            <a:off x="2321443" y="2211573"/>
+            <a:ext cx="618738" cy="893134"/>
+            <a:chOff x="2321443" y="2211573"/>
+            <a:chExt cx="618738" cy="893134"/>
+          </a:xfrm>
+        </p:grpSpPr>
+        <p:cxnSp>
+          <p:nvCxnSpPr>
+            <p:cNvPr id="5" name="Connettore a gomito 4">
+              <a:extLst>
+                <a:ext uri="{FF2B5EF4-FFF2-40B4-BE49-F238E27FC236}">
+                  <a16:creationId xmlns:a16="http://schemas.microsoft.com/office/drawing/2014/main" id="{20FECF45-9275-449A-B486-B1B63CDE7F38}"/>
+                </a:ext>
+              </a:extLst>
+            </p:cNvPr>
+            <p:cNvCxnSpPr>
+              <a:cxnSpLocks/>
+            </p:cNvCxnSpPr>
+            <p:nvPr/>
+          </p:nvCxnSpPr>
+          <p:spPr>
+            <a:xfrm flipH="1">
+              <a:off x="2527689" y="2211573"/>
+              <a:ext cx="412492" cy="297711"/>
+            </a:xfrm>
+            <a:prstGeom prst="bentConnector3">
+              <a:avLst/>
+            </a:prstGeom>
+            <a:ln/>
+          </p:spPr>
+          <p:style>
+            <a:lnRef idx="1">
+              <a:schemeClr val="accent6"/>
+            </a:lnRef>
+            <a:fillRef idx="0">
+              <a:schemeClr val="accent6"/>
+            </a:fillRef>
+            <a:effectRef idx="0">
+              <a:schemeClr val="accent6"/>
+            </a:effectRef>
+            <a:fontRef idx="minor">
+              <a:schemeClr val="tx1"/>
+            </a:fontRef>
+          </p:style>
+        </p:cxnSp>
+        <p:cxnSp>
+          <p:nvCxnSpPr>
+            <p:cNvPr id="8" name="Connettore a gomito 7">
+              <a:extLst>
+                <a:ext uri="{FF2B5EF4-FFF2-40B4-BE49-F238E27FC236}">
+                  <a16:creationId xmlns:a16="http://schemas.microsoft.com/office/drawing/2014/main" id="{4B278F0D-6231-4344-BA26-BDC44FD5D6E0}"/>
+                </a:ext>
+              </a:extLst>
+            </p:cNvPr>
+            <p:cNvCxnSpPr>
+              <a:cxnSpLocks/>
+            </p:cNvCxnSpPr>
+            <p:nvPr/>
+          </p:nvCxnSpPr>
+          <p:spPr>
+            <a:xfrm flipH="1">
+              <a:off x="2321443" y="2509284"/>
+              <a:ext cx="412492" cy="297711"/>
+            </a:xfrm>
+            <a:prstGeom prst="bentConnector3">
+              <a:avLst/>
+            </a:prstGeom>
+            <a:ln>
+              <a:solidFill>
+                <a:srgbClr val="FF0000"/>
+              </a:solidFill>
+            </a:ln>
+          </p:spPr>
+          <p:style>
+            <a:lnRef idx="1">
+              <a:schemeClr val="accent1"/>
+            </a:lnRef>
+            <a:fillRef idx="0">
+              <a:schemeClr val="accent1"/>
+            </a:fillRef>
+            <a:effectRef idx="0">
+              <a:schemeClr val="accent1"/>
+            </a:effectRef>
+            <a:fontRef idx="minor">
+              <a:schemeClr val="tx1"/>
+            </a:fontRef>
+          </p:style>
+        </p:cxnSp>
+        <p:cxnSp>
+          <p:nvCxnSpPr>
+            <p:cNvPr id="9" name="Connettore a gomito 8">
+              <a:extLst>
+                <a:ext uri="{FF2B5EF4-FFF2-40B4-BE49-F238E27FC236}">
+                  <a16:creationId xmlns:a16="http://schemas.microsoft.com/office/drawing/2014/main" id="{0540759E-5E02-4E63-A918-494114C8F250}"/>
+                </a:ext>
+              </a:extLst>
+            </p:cNvPr>
+            <p:cNvCxnSpPr>
+              <a:cxnSpLocks/>
+            </p:cNvCxnSpPr>
+            <p:nvPr/>
+          </p:nvCxnSpPr>
+          <p:spPr>
+            <a:xfrm>
+              <a:off x="2321443" y="2806996"/>
+              <a:ext cx="412492" cy="297711"/>
+            </a:xfrm>
+            <a:prstGeom prst="bentConnector3">
+              <a:avLst/>
+            </a:prstGeom>
+            <a:ln>
+              <a:solidFill>
+                <a:srgbClr val="FF0000"/>
+              </a:solidFill>
+            </a:ln>
+          </p:spPr>
+          <p:style>
+            <a:lnRef idx="1">
+              <a:schemeClr val="accent1"/>
+            </a:lnRef>
+            <a:fillRef idx="0">
+              <a:schemeClr val="accent1"/>
+            </a:fillRef>
+            <a:effectRef idx="0">
+              <a:schemeClr val="accent1"/>
+            </a:effectRef>
+            <a:fontRef idx="minor">
+              <a:schemeClr val="tx1"/>
+            </a:fontRef>
+          </p:style>
+        </p:cxnSp>
+        <p:cxnSp>
+          <p:nvCxnSpPr>
+            <p:cNvPr id="10" name="Connettore a gomito 9">
+              <a:extLst>
+                <a:ext uri="{FF2B5EF4-FFF2-40B4-BE49-F238E27FC236}">
+                  <a16:creationId xmlns:a16="http://schemas.microsoft.com/office/drawing/2014/main" id="{D9C2FDAE-5C39-426E-85C2-B50B8E362272}"/>
+                </a:ext>
+              </a:extLst>
+            </p:cNvPr>
+            <p:cNvCxnSpPr>
+              <a:cxnSpLocks/>
+            </p:cNvCxnSpPr>
+            <p:nvPr/>
+          </p:nvCxnSpPr>
+          <p:spPr>
+            <a:xfrm>
+              <a:off x="2527689" y="2509284"/>
+              <a:ext cx="412492" cy="297711"/>
+            </a:xfrm>
+            <a:prstGeom prst="bentConnector3">
+              <a:avLst/>
+            </a:prstGeom>
+            <a:ln/>
+          </p:spPr>
+          <p:style>
+            <a:lnRef idx="1">
+              <a:schemeClr val="accent6"/>
+            </a:lnRef>
+            <a:fillRef idx="0">
+              <a:schemeClr val="accent6"/>
+            </a:fillRef>
+            <a:effectRef idx="0">
+              <a:schemeClr val="accent6"/>
+            </a:effectRef>
+            <a:fontRef idx="minor">
+              <a:schemeClr val="tx1"/>
+            </a:fontRef>
+          </p:style>
+        </p:cxnSp>
+      </p:grpSp>
+      <p:grpSp>
+        <p:nvGrpSpPr>
+          <p:cNvPr id="13" name="Gruppo 12">
+            <a:extLst>
+              <a:ext uri="{FF2B5EF4-FFF2-40B4-BE49-F238E27FC236}">
+                <a16:creationId xmlns:a16="http://schemas.microsoft.com/office/drawing/2014/main" id="{671C989B-0766-4611-B455-48210C67D477}"/>
+              </a:ext>
+            </a:extLst>
+          </p:cNvPr>
+          <p:cNvGrpSpPr/>
+          <p:nvPr/>
+        </p:nvGrpSpPr>
+        <p:grpSpPr>
+          <a:xfrm>
+            <a:off x="4419602" y="2211573"/>
+            <a:ext cx="618738" cy="893134"/>
+            <a:chOff x="4419602" y="2211573"/>
+            <a:chExt cx="618738" cy="893134"/>
+          </a:xfrm>
+        </p:grpSpPr>
+        <p:cxnSp>
+          <p:nvCxnSpPr>
+            <p:cNvPr id="27" name="Connettore a gomito 26">
+              <a:extLst>
+                <a:ext uri="{FF2B5EF4-FFF2-40B4-BE49-F238E27FC236}">
+                  <a16:creationId xmlns:a16="http://schemas.microsoft.com/office/drawing/2014/main" id="{3EAA1545-E3E3-4AD9-9BFC-19F5123E0441}"/>
+                </a:ext>
+              </a:extLst>
+            </p:cNvPr>
+            <p:cNvCxnSpPr>
+              <a:cxnSpLocks/>
+            </p:cNvCxnSpPr>
+            <p:nvPr/>
+          </p:nvCxnSpPr>
+          <p:spPr>
+            <a:xfrm flipH="1">
+              <a:off x="4625848" y="2211573"/>
+              <a:ext cx="412492" cy="297711"/>
+            </a:xfrm>
+            <a:prstGeom prst="bentConnector3">
+              <a:avLst/>
+            </a:prstGeom>
+            <a:ln/>
+          </p:spPr>
+          <p:style>
+            <a:lnRef idx="2">
+              <a:schemeClr val="accent1"/>
+            </a:lnRef>
+            <a:fillRef idx="0">
+              <a:schemeClr val="accent1"/>
+            </a:fillRef>
+            <a:effectRef idx="1">
+              <a:schemeClr val="accent1"/>
+            </a:effectRef>
+            <a:fontRef idx="minor">
+              <a:schemeClr val="tx1"/>
+            </a:fontRef>
+          </p:style>
+        </p:cxnSp>
+        <p:cxnSp>
+          <p:nvCxnSpPr>
+            <p:cNvPr id="28" name="Connettore a gomito 27">
+              <a:extLst>
+                <a:ext uri="{FF2B5EF4-FFF2-40B4-BE49-F238E27FC236}">
+                  <a16:creationId xmlns:a16="http://schemas.microsoft.com/office/drawing/2014/main" id="{E4CD50A3-0C8B-4CF4-88BA-091714A97567}"/>
+                </a:ext>
+              </a:extLst>
+            </p:cNvPr>
+            <p:cNvCxnSpPr>
+              <a:cxnSpLocks/>
+            </p:cNvCxnSpPr>
+            <p:nvPr/>
+          </p:nvCxnSpPr>
+          <p:spPr>
+            <a:xfrm flipH="1">
+              <a:off x="4419602" y="2509284"/>
+              <a:ext cx="412492" cy="297711"/>
+            </a:xfrm>
+            <a:prstGeom prst="bentConnector3">
+              <a:avLst/>
+            </a:prstGeom>
+            <a:ln>
+              <a:solidFill>
+                <a:srgbClr val="FF0000"/>
+              </a:solidFill>
+            </a:ln>
+          </p:spPr>
+          <p:style>
+            <a:lnRef idx="1">
+              <a:schemeClr val="accent1"/>
+            </a:lnRef>
+            <a:fillRef idx="0">
+              <a:schemeClr val="accent1"/>
+            </a:fillRef>
+            <a:effectRef idx="0">
+              <a:schemeClr val="accent1"/>
+            </a:effectRef>
+            <a:fontRef idx="minor">
+              <a:schemeClr val="tx1"/>
+            </a:fontRef>
+          </p:style>
+        </p:cxnSp>
+        <p:cxnSp>
+          <p:nvCxnSpPr>
+            <p:cNvPr id="29" name="Connettore a gomito 28">
+              <a:extLst>
+                <a:ext uri="{FF2B5EF4-FFF2-40B4-BE49-F238E27FC236}">
+                  <a16:creationId xmlns:a16="http://schemas.microsoft.com/office/drawing/2014/main" id="{9E00AF1C-DA3A-43CE-A1D9-AEE189AD7A54}"/>
+                </a:ext>
+              </a:extLst>
+            </p:cNvPr>
+            <p:cNvCxnSpPr>
+              <a:cxnSpLocks/>
+            </p:cNvCxnSpPr>
+            <p:nvPr/>
+          </p:nvCxnSpPr>
+          <p:spPr>
+            <a:xfrm>
+              <a:off x="4419602" y="2806996"/>
+              <a:ext cx="412492" cy="297711"/>
+            </a:xfrm>
+            <a:prstGeom prst="bentConnector3">
+              <a:avLst/>
+            </a:prstGeom>
+            <a:ln>
+              <a:solidFill>
+                <a:srgbClr val="FF0000"/>
+              </a:solidFill>
+            </a:ln>
+          </p:spPr>
+          <p:style>
+            <a:lnRef idx="1">
+              <a:schemeClr val="accent1"/>
+            </a:lnRef>
+            <a:fillRef idx="0">
+              <a:schemeClr val="accent1"/>
+            </a:fillRef>
+            <a:effectRef idx="0">
+              <a:schemeClr val="accent1"/>
+            </a:effectRef>
+            <a:fontRef idx="minor">
+              <a:schemeClr val="tx1"/>
+            </a:fontRef>
+          </p:style>
+        </p:cxnSp>
+        <p:cxnSp>
+          <p:nvCxnSpPr>
+            <p:cNvPr id="30" name="Connettore a gomito 29">
+              <a:extLst>
+                <a:ext uri="{FF2B5EF4-FFF2-40B4-BE49-F238E27FC236}">
+                  <a16:creationId xmlns:a16="http://schemas.microsoft.com/office/drawing/2014/main" id="{42D32862-7BAF-495F-A6BB-3BC4CF9471CE}"/>
+                </a:ext>
+              </a:extLst>
+            </p:cNvPr>
+            <p:cNvCxnSpPr>
+              <a:cxnSpLocks/>
+            </p:cNvCxnSpPr>
+            <p:nvPr/>
+          </p:nvCxnSpPr>
+          <p:spPr>
+            <a:xfrm>
+              <a:off x="4625848" y="2509284"/>
+              <a:ext cx="412492" cy="297711"/>
+            </a:xfrm>
+            <a:prstGeom prst="bentConnector3">
+              <a:avLst/>
+            </a:prstGeom>
+            <a:ln/>
+          </p:spPr>
+          <p:style>
+            <a:lnRef idx="2">
+              <a:schemeClr val="accent1"/>
+            </a:lnRef>
+            <a:fillRef idx="0">
+              <a:schemeClr val="accent1"/>
+            </a:fillRef>
+            <a:effectRef idx="1">
+              <a:schemeClr val="accent1"/>
+            </a:effectRef>
+            <a:fontRef idx="minor">
+              <a:schemeClr val="tx1"/>
+            </a:fontRef>
+          </p:style>
+        </p:cxnSp>
+      </p:grpSp>
+      <p:grpSp>
+        <p:nvGrpSpPr>
+          <p:cNvPr id="15" name="Gruppo 14">
+            <a:extLst>
+              <a:ext uri="{FF2B5EF4-FFF2-40B4-BE49-F238E27FC236}">
+                <a16:creationId xmlns:a16="http://schemas.microsoft.com/office/drawing/2014/main" id="{FEC60DFC-C3F3-4D1B-B1F8-BE23091E2B13}"/>
+              </a:ext>
+            </a:extLst>
+          </p:cNvPr>
+          <p:cNvGrpSpPr/>
+          <p:nvPr/>
+        </p:nvGrpSpPr>
+        <p:grpSpPr>
+          <a:xfrm>
+            <a:off x="6689934" y="2264735"/>
+            <a:ext cx="659987" cy="893134"/>
+            <a:chOff x="6689934" y="2264735"/>
+            <a:chExt cx="659987" cy="893134"/>
+          </a:xfrm>
+        </p:grpSpPr>
+        <p:cxnSp>
+          <p:nvCxnSpPr>
+            <p:cNvPr id="31" name="Connettore a gomito 30">
+              <a:extLst>
+                <a:ext uri="{FF2B5EF4-FFF2-40B4-BE49-F238E27FC236}">
+                  <a16:creationId xmlns:a16="http://schemas.microsoft.com/office/drawing/2014/main" id="{533ED62E-8274-4B7F-9941-8D47A38EC178}"/>
+                </a:ext>
+              </a:extLst>
+            </p:cNvPr>
+            <p:cNvCxnSpPr>
+              <a:cxnSpLocks/>
+            </p:cNvCxnSpPr>
+            <p:nvPr/>
+          </p:nvCxnSpPr>
+          <p:spPr>
+            <a:xfrm flipH="1">
+              <a:off x="6896180" y="2264735"/>
+              <a:ext cx="453741" cy="297711"/>
+            </a:xfrm>
+            <a:prstGeom prst="bentConnector3">
+              <a:avLst/>
+            </a:prstGeom>
+            <a:ln/>
+          </p:spPr>
+          <p:style>
+            <a:lnRef idx="2">
+              <a:schemeClr val="accent1"/>
+            </a:lnRef>
+            <a:fillRef idx="0">
+              <a:schemeClr val="accent1"/>
+            </a:fillRef>
+            <a:effectRef idx="1">
+              <a:schemeClr val="accent1"/>
+            </a:effectRef>
+            <a:fontRef idx="minor">
+              <a:schemeClr val="tx1"/>
+            </a:fontRef>
+          </p:style>
+        </p:cxnSp>
+        <p:cxnSp>
+          <p:nvCxnSpPr>
+            <p:cNvPr id="32" name="Connettore a gomito 31">
+              <a:extLst>
+                <a:ext uri="{FF2B5EF4-FFF2-40B4-BE49-F238E27FC236}">
+                  <a16:creationId xmlns:a16="http://schemas.microsoft.com/office/drawing/2014/main" id="{CD5442C0-E3F7-4C7D-9777-222680F36D80}"/>
+                </a:ext>
+              </a:extLst>
+            </p:cNvPr>
+            <p:cNvCxnSpPr>
+              <a:cxnSpLocks/>
+            </p:cNvCxnSpPr>
+            <p:nvPr/>
+          </p:nvCxnSpPr>
+          <p:spPr>
+            <a:xfrm flipH="1">
+              <a:off x="6689934" y="2562446"/>
+              <a:ext cx="453741" cy="297711"/>
+            </a:xfrm>
+            <a:prstGeom prst="bentConnector3">
+              <a:avLst/>
+            </a:prstGeom>
+            <a:ln/>
+          </p:spPr>
+          <p:style>
+            <a:lnRef idx="1">
+              <a:schemeClr val="accent6"/>
+            </a:lnRef>
+            <a:fillRef idx="0">
+              <a:schemeClr val="accent6"/>
+            </a:fillRef>
+            <a:effectRef idx="0">
+              <a:schemeClr val="accent6"/>
+            </a:effectRef>
+            <a:fontRef idx="minor">
+              <a:schemeClr val="tx1"/>
+            </a:fontRef>
+          </p:style>
+        </p:cxnSp>
+        <p:cxnSp>
+          <p:nvCxnSpPr>
+            <p:cNvPr id="33" name="Connettore a gomito 32">
+              <a:extLst>
+                <a:ext uri="{FF2B5EF4-FFF2-40B4-BE49-F238E27FC236}">
+                  <a16:creationId xmlns:a16="http://schemas.microsoft.com/office/drawing/2014/main" id="{8CA699CF-3100-4A5D-A898-344029F98C86}"/>
+                </a:ext>
+              </a:extLst>
+            </p:cNvPr>
+            <p:cNvCxnSpPr>
+              <a:cxnSpLocks/>
+            </p:cNvCxnSpPr>
+            <p:nvPr/>
+          </p:nvCxnSpPr>
+          <p:spPr>
+            <a:xfrm>
+              <a:off x="6689934" y="2860158"/>
+              <a:ext cx="453741" cy="297711"/>
+            </a:xfrm>
+            <a:prstGeom prst="bentConnector3">
+              <a:avLst/>
+            </a:prstGeom>
+            <a:ln/>
+          </p:spPr>
+          <p:style>
+            <a:lnRef idx="1">
+              <a:schemeClr val="accent6"/>
+            </a:lnRef>
+            <a:fillRef idx="0">
+              <a:schemeClr val="accent6"/>
+            </a:fillRef>
+            <a:effectRef idx="0">
+              <a:schemeClr val="accent6"/>
+            </a:effectRef>
+            <a:fontRef idx="minor">
+              <a:schemeClr val="tx1"/>
+            </a:fontRef>
+          </p:style>
+        </p:cxnSp>
+        <p:cxnSp>
+          <p:nvCxnSpPr>
+            <p:cNvPr id="34" name="Connettore a gomito 33">
+              <a:extLst>
+                <a:ext uri="{FF2B5EF4-FFF2-40B4-BE49-F238E27FC236}">
+                  <a16:creationId xmlns:a16="http://schemas.microsoft.com/office/drawing/2014/main" id="{B78FEB12-CFE7-4311-A094-350D3F5700BC}"/>
+                </a:ext>
+              </a:extLst>
+            </p:cNvPr>
+            <p:cNvCxnSpPr>
+              <a:cxnSpLocks/>
+            </p:cNvCxnSpPr>
+            <p:nvPr/>
+          </p:nvCxnSpPr>
+          <p:spPr>
+            <a:xfrm>
+              <a:off x="6896180" y="2562446"/>
+              <a:ext cx="453741" cy="297711"/>
+            </a:xfrm>
+            <a:prstGeom prst="bentConnector3">
+              <a:avLst/>
+            </a:prstGeom>
+            <a:ln/>
+          </p:spPr>
+          <p:style>
+            <a:lnRef idx="2">
+              <a:schemeClr val="accent1"/>
+            </a:lnRef>
+            <a:fillRef idx="0">
+              <a:schemeClr val="accent1"/>
+            </a:fillRef>
+            <a:effectRef idx="1">
+              <a:schemeClr val="accent1"/>
+            </a:effectRef>
+            <a:fontRef idx="minor">
+              <a:schemeClr val="tx1"/>
+            </a:fontRef>
+          </p:style>
+        </p:cxnSp>
+      </p:grpSp>
+    </p:spTree>
+    <p:extLst>
+      <p:ext uri="{BB962C8B-B14F-4D97-AF65-F5344CB8AC3E}">
+        <p14:creationId xmlns:p14="http://schemas.microsoft.com/office/powerpoint/2010/main" val="2977924206"/>
+      </p:ext>
+    </p:extLst>
+  </p:cSld>
+  <p:clrMapOvr>
+    <a:masterClrMapping/>
+  </p:clrMapOvr>
+</p:sld>
+</file>
+
 <file path=ppt/theme/theme1.xml><?xml version="1.0" encoding="utf-8"?>
 <a:theme xmlns:a="http://schemas.openxmlformats.org/drawingml/2006/main" name="Tema di Office">
   <a:themeElements>

</xml_diff>